<commit_message>
added line to ln.
</commit_message>
<xml_diff>
--- a/Chapter2_Algorithm_Analysis/slides/Chapter2_Algorithm_Analysis.pptx
+++ b/Chapter2_Algorithm_Analysis/slides/Chapter2_Algorithm_Analysis.pptx
@@ -6156,7 +6156,7 @@
           <a:p>
             <a:fld id="{E46FABD4-8113-4726-8979-3F798E899A77}" type="datetimeFigureOut">
               <a:rPr lang="en-US" smtClean="0"/>
-              <a:t>9/30/2022</a:t>
+              <a:t>11/25/2022</a:t>
             </a:fld>
             <a:endParaRPr lang="en-US"/>
           </a:p>
@@ -6354,7 +6354,7 @@
           <a:p>
             <a:fld id="{E46FABD4-8113-4726-8979-3F798E899A77}" type="datetimeFigureOut">
               <a:rPr lang="en-US" smtClean="0"/>
-              <a:t>9/30/2022</a:t>
+              <a:t>11/25/2022</a:t>
             </a:fld>
             <a:endParaRPr lang="en-US"/>
           </a:p>
@@ -6562,7 +6562,7 @@
           <a:p>
             <a:fld id="{E46FABD4-8113-4726-8979-3F798E899A77}" type="datetimeFigureOut">
               <a:rPr lang="en-US" smtClean="0"/>
-              <a:t>9/30/2022</a:t>
+              <a:t>11/25/2022</a:t>
             </a:fld>
             <a:endParaRPr lang="en-US"/>
           </a:p>
@@ -6760,7 +6760,7 @@
           <a:p>
             <a:fld id="{E46FABD4-8113-4726-8979-3F798E899A77}" type="datetimeFigureOut">
               <a:rPr lang="en-US" smtClean="0"/>
-              <a:t>9/30/2022</a:t>
+              <a:t>11/25/2022</a:t>
             </a:fld>
             <a:endParaRPr lang="en-US"/>
           </a:p>
@@ -7035,7 +7035,7 @@
           <a:p>
             <a:fld id="{E46FABD4-8113-4726-8979-3F798E899A77}" type="datetimeFigureOut">
               <a:rPr lang="en-US" smtClean="0"/>
-              <a:t>9/30/2022</a:t>
+              <a:t>11/25/2022</a:t>
             </a:fld>
             <a:endParaRPr lang="en-US"/>
           </a:p>
@@ -7300,7 +7300,7 @@
           <a:p>
             <a:fld id="{E46FABD4-8113-4726-8979-3F798E899A77}" type="datetimeFigureOut">
               <a:rPr lang="en-US" smtClean="0"/>
-              <a:t>9/30/2022</a:t>
+              <a:t>11/25/2022</a:t>
             </a:fld>
             <a:endParaRPr lang="en-US"/>
           </a:p>
@@ -7712,7 +7712,7 @@
           <a:p>
             <a:fld id="{E46FABD4-8113-4726-8979-3F798E899A77}" type="datetimeFigureOut">
               <a:rPr lang="en-US" smtClean="0"/>
-              <a:t>9/30/2022</a:t>
+              <a:t>11/25/2022</a:t>
             </a:fld>
             <a:endParaRPr lang="en-US"/>
           </a:p>
@@ -7853,7 +7853,7 @@
           <a:p>
             <a:fld id="{E46FABD4-8113-4726-8979-3F798E899A77}" type="datetimeFigureOut">
               <a:rPr lang="en-US" smtClean="0"/>
-              <a:t>9/30/2022</a:t>
+              <a:t>11/25/2022</a:t>
             </a:fld>
             <a:endParaRPr lang="en-US"/>
           </a:p>
@@ -7966,7 +7966,7 @@
           <a:p>
             <a:fld id="{E46FABD4-8113-4726-8979-3F798E899A77}" type="datetimeFigureOut">
               <a:rPr lang="en-US" smtClean="0"/>
-              <a:t>9/30/2022</a:t>
+              <a:t>11/25/2022</a:t>
             </a:fld>
             <a:endParaRPr lang="en-US"/>
           </a:p>
@@ -8277,7 +8277,7 @@
           <a:p>
             <a:fld id="{E46FABD4-8113-4726-8979-3F798E899A77}" type="datetimeFigureOut">
               <a:rPr lang="en-US" smtClean="0"/>
-              <a:t>9/30/2022</a:t>
+              <a:t>11/25/2022</a:t>
             </a:fld>
             <a:endParaRPr lang="en-US"/>
           </a:p>
@@ -8565,7 +8565,7 @@
           <a:p>
             <a:fld id="{E46FABD4-8113-4726-8979-3F798E899A77}" type="datetimeFigureOut">
               <a:rPr lang="en-US" smtClean="0"/>
-              <a:t>9/30/2022</a:t>
+              <a:t>11/25/2022</a:t>
             </a:fld>
             <a:endParaRPr lang="en-US"/>
           </a:p>
@@ -8806,7 +8806,7 @@
           <a:p>
             <a:fld id="{E46FABD4-8113-4726-8979-3F798E899A77}" type="datetimeFigureOut">
               <a:rPr lang="en-US" smtClean="0"/>
-              <a:t>9/30/2022</a:t>
+              <a:t>11/25/2022</a:t>
             </a:fld>
             <a:endParaRPr lang="en-US"/>
           </a:p>
@@ -11568,8 +11568,8 @@
           </a:p>
         </p:txBody>
       </p:sp>
-      <mc:AlternateContent xmlns:mc="http://schemas.openxmlformats.org/markup-compatibility/2006" xmlns:a14="http://schemas.microsoft.com/office/drawing/2010/main">
-        <mc:Choice Requires="a14">
+      <mc:AlternateContent xmlns:mc="http://schemas.openxmlformats.org/markup-compatibility/2006">
+        <mc:Choice xmlns:a14="http://schemas.microsoft.com/office/drawing/2010/main" Requires="a14">
           <p:sp>
             <p:nvSpPr>
               <p:cNvPr id="4" name="Content Placeholder 3">
@@ -11961,6 +11961,71 @@
                       </a:rPr>
                       <m:t>=</m:t>
                     </m:r>
+                    <m:func>
+                      <m:funcPr>
+                        <m:ctrlPr>
+                          <a:rPr lang="en-US" b="0" i="1" smtClean="0">
+                            <a:latin typeface="Cambria Math" panose="02040503050406030204" pitchFamily="18" charset="0"/>
+                          </a:rPr>
+                        </m:ctrlPr>
+                      </m:funcPr>
+                      <m:fName>
+                        <m:sSub>
+                          <m:sSubPr>
+                            <m:ctrlPr>
+                              <a:rPr lang="en-US" b="0" i="1" smtClean="0">
+                                <a:latin typeface="Cambria Math" panose="02040503050406030204" pitchFamily="18" charset="0"/>
+                              </a:rPr>
+                            </m:ctrlPr>
+                          </m:sSubPr>
+                          <m:e>
+                            <m:r>
+                              <m:rPr>
+                                <m:sty m:val="p"/>
+                              </m:rPr>
+                              <a:rPr lang="en-US" b="0" i="0" smtClean="0">
+                                <a:latin typeface="Cambria Math" panose="02040503050406030204" pitchFamily="18" charset="0"/>
+                              </a:rPr>
+                              <m:t>log</m:t>
+                            </m:r>
+                          </m:e>
+                          <m:sub>
+                            <m:r>
+                              <a:rPr lang="en-US" b="0" i="1" smtClean="0">
+                                <a:latin typeface="Cambria Math" panose="02040503050406030204" pitchFamily="18" charset="0"/>
+                              </a:rPr>
+                              <m:t>2</m:t>
+                            </m:r>
+                          </m:sub>
+                        </m:sSub>
+                      </m:fName>
+                      <m:e>
+                        <m:r>
+                          <a:rPr lang="en-US" b="0" i="1" smtClean="0">
+                            <a:latin typeface="Cambria Math" panose="02040503050406030204" pitchFamily="18" charset="0"/>
+                          </a:rPr>
+                          <m:t>(</m:t>
+                        </m:r>
+                        <m:r>
+                          <a:rPr lang="en-US" b="0" i="1" smtClean="0">
+                            <a:latin typeface="Cambria Math" panose="02040503050406030204" pitchFamily="18" charset="0"/>
+                          </a:rPr>
+                          <m:t>𝑛</m:t>
+                        </m:r>
+                        <m:r>
+                          <a:rPr lang="en-US" b="0" i="1" smtClean="0">
+                            <a:latin typeface="Cambria Math" panose="02040503050406030204" pitchFamily="18" charset="0"/>
+                          </a:rPr>
+                          <m:t>)</m:t>
+                        </m:r>
+                      </m:e>
+                    </m:func>
+                    <m:r>
+                      <a:rPr lang="en-US" b="0" i="1" smtClean="0">
+                        <a:latin typeface="Cambria Math" panose="02040503050406030204" pitchFamily="18" charset="0"/>
+                      </a:rPr>
+                      <m:t>=</m:t>
+                    </m:r>
                     <m:f>
                       <m:fPr>
                         <m:ctrlPr>
@@ -11973,40 +12038,21 @@
                         <m:func>
                           <m:funcPr>
                             <m:ctrlPr>
-                              <a:rPr lang="en-US" i="1">
+                              <a:rPr lang="en-US" b="0" i="1" smtClean="0">
                                 <a:latin typeface="Cambria Math" panose="02040503050406030204" pitchFamily="18" charset="0"/>
                               </a:rPr>
                             </m:ctrlPr>
                           </m:funcPr>
                           <m:fName>
-                            <m:sSub>
-                              <m:sSubPr>
-                                <m:ctrlPr>
-                                  <a:rPr lang="en-US" i="1">
-                                    <a:latin typeface="Cambria Math" panose="02040503050406030204" pitchFamily="18" charset="0"/>
-                                  </a:rPr>
-                                </m:ctrlPr>
-                              </m:sSubPr>
-                              <m:e>
-                                <m:r>
-                                  <m:rPr>
-                                    <m:sty m:val="p"/>
-                                  </m:rPr>
-                                  <a:rPr lang="en-US">
-                                    <a:latin typeface="Cambria Math" panose="02040503050406030204" pitchFamily="18" charset="0"/>
-                                  </a:rPr>
-                                  <m:t>log</m:t>
-                                </m:r>
-                              </m:e>
-                              <m:sub>
-                                <m:r>
-                                  <a:rPr lang="en-US" i="1">
-                                    <a:latin typeface="Cambria Math" panose="02040503050406030204" pitchFamily="18" charset="0"/>
-                                  </a:rPr>
-                                  <m:t>2</m:t>
-                                </m:r>
-                              </m:sub>
-                            </m:sSub>
+                            <m:r>
+                              <m:rPr>
+                                <m:sty m:val="p"/>
+                              </m:rPr>
+                              <a:rPr lang="en-US" b="0" i="0" smtClean="0">
+                                <a:latin typeface="Cambria Math" panose="02040503050406030204" pitchFamily="18" charset="0"/>
+                              </a:rPr>
+                              <m:t>log</m:t>
+                            </m:r>
                           </m:fName>
                           <m:e>
                             <m:r>
@@ -12040,34 +12086,15 @@
                             </m:ctrlPr>
                           </m:funcPr>
                           <m:fName>
-                            <m:sSub>
-                              <m:sSubPr>
-                                <m:ctrlPr>
-                                  <a:rPr lang="en-US" b="0" i="1" smtClean="0">
-                                    <a:latin typeface="Cambria Math" panose="02040503050406030204" pitchFamily="18" charset="0"/>
-                                  </a:rPr>
-                                </m:ctrlPr>
-                              </m:sSubPr>
-                              <m:e>
-                                <m:r>
-                                  <m:rPr>
-                                    <m:sty m:val="p"/>
-                                  </m:rPr>
-                                  <a:rPr lang="en-US" b="0" i="0" smtClean="0">
-                                    <a:latin typeface="Cambria Math" panose="02040503050406030204" pitchFamily="18" charset="0"/>
-                                  </a:rPr>
-                                  <m:t>log</m:t>
-                                </m:r>
-                              </m:e>
-                              <m:sub>
-                                <m:r>
-                                  <a:rPr lang="en-US" b="0" i="1" smtClean="0">
-                                    <a:latin typeface="Cambria Math" panose="02040503050406030204" pitchFamily="18" charset="0"/>
-                                  </a:rPr>
-                                  <m:t>2</m:t>
-                                </m:r>
-                              </m:sub>
-                            </m:sSub>
+                            <m:r>
+                              <m:rPr>
+                                <m:sty m:val="p"/>
+                              </m:rPr>
+                              <a:rPr lang="en-US" b="0" i="0" smtClean="0">
+                                <a:latin typeface="Cambria Math" panose="02040503050406030204" pitchFamily="18" charset="0"/>
+                              </a:rPr>
+                              <m:t>log</m:t>
+                            </m:r>
                           </m:fName>
                           <m:e>
                             <m:r>
@@ -12176,7 +12203,7 @@
             </p:txBody>
           </p:sp>
         </mc:Choice>
-        <mc:Fallback xmlns="">
+        <mc:Fallback>
           <p:sp>
             <p:nvSpPr>
               <p:cNvPr id="4" name="Content Placeholder 3">
@@ -12684,7 +12711,7 @@
         </p:style>
         <p:txBody>
           <a:bodyPr>
-            <a:normAutofit fontScale="92500" lnSpcReduction="20000"/>
+            <a:normAutofit fontScale="85000" lnSpcReduction="10000"/>
           </a:bodyPr>
           <a:lstStyle/>
           <a:p>
@@ -12727,8 +12754,8 @@
           </a:p>
         </p:txBody>
       </p:sp>
-      <mc:AlternateContent xmlns:mc="http://schemas.openxmlformats.org/markup-compatibility/2006">
-        <mc:Choice xmlns:a14="http://schemas.microsoft.com/office/drawing/2010/main" Requires="a14">
+      <mc:AlternateContent xmlns:mc="http://schemas.openxmlformats.org/markup-compatibility/2006" xmlns:a14="http://schemas.microsoft.com/office/drawing/2010/main">
+        <mc:Choice Requires="a14">
           <p:sp>
             <p:nvSpPr>
               <p:cNvPr id="4" name="TextBox 3">
@@ -12757,6 +12784,7 @@
               </a:bodyPr>
               <a:lstStyle/>
               <a:p>
+                <a:pPr/>
                 <a14:m>
                   <m:oMathPara xmlns:m="http://schemas.openxmlformats.org/officeDocument/2006/math">
                     <m:oMathParaPr>
@@ -12793,7 +12821,7 @@
             </p:txBody>
           </p:sp>
         </mc:Choice>
-        <mc:Fallback>
+        <mc:Fallback xmlns="">
           <p:sp>
             <p:nvSpPr>
               <p:cNvPr id="4" name="TextBox 3">
@@ -12887,8 +12915,8 @@
           </a:p>
         </p:txBody>
       </p:sp>
-      <mc:AlternateContent xmlns:mc="http://schemas.openxmlformats.org/markup-compatibility/2006">
-        <mc:Choice xmlns:a14="http://schemas.microsoft.com/office/drawing/2010/main" Requires="a14">
+      <mc:AlternateContent xmlns:mc="http://schemas.openxmlformats.org/markup-compatibility/2006" xmlns:a14="http://schemas.microsoft.com/office/drawing/2010/main">
+        <mc:Choice Requires="a14">
           <p:sp>
             <p:nvSpPr>
               <p:cNvPr id="6" name="TextBox 5">
@@ -12917,6 +12945,7 @@
               </a:bodyPr>
               <a:lstStyle/>
               <a:p>
+                <a:pPr/>
                 <a14:m>
                   <m:oMathPara xmlns:m="http://schemas.openxmlformats.org/officeDocument/2006/math">
                     <m:oMathParaPr>
@@ -12953,7 +12982,7 @@
             </p:txBody>
           </p:sp>
         </mc:Choice>
-        <mc:Fallback>
+        <mc:Fallback xmlns="">
           <p:sp>
             <p:nvSpPr>
               <p:cNvPr id="6" name="TextBox 5">
@@ -13073,7 +13102,7 @@
             </p:spPr>
             <p:txBody>
               <a:bodyPr>
-                <a:normAutofit fontScale="92500" lnSpcReduction="20000"/>
+                <a:normAutofit fontScale="85000" lnSpcReduction="10000"/>
               </a:bodyPr>
               <a:lstStyle/>
               <a:p>
@@ -13215,7 +13244,7 @@
                       <a:rPr lang="en-US" sz="2000" b="0" i="1" smtClean="0">
                         <a:latin typeface="Cambria Math" panose="02040503050406030204" pitchFamily="18" charset="0"/>
                       </a:rPr>
-                      <m:t>≫</m:t>
+                      <m:t>&gt;</m:t>
                     </m:r>
                     <m:r>
                       <a:rPr lang="en-US" sz="2000" b="0" i="1" smtClean="0">
@@ -13227,7 +13256,7 @@
                 </a14:m>
                 <a:r>
                   <a:rPr lang="en-US" sz="2000" dirty="0"/>
-                  <a:t> then we could also say:</a:t>
+                  <a:t> then we can also say:</a:t>
                 </a:r>
               </a:p>
               <a:p>
@@ -13322,7 +13351,21 @@
                 </a:r>
                 <a:r>
                   <a:rPr lang="en-US" sz="2000" dirty="0"/>
-                  <a:t>: Sorting the first list and then using binary search would be a better idea if </a:t>
+                  <a:t>: Sorting the first list and then using binary search would be a better idea if both </a:t>
+                </a:r>
+                <a14:m>
+                  <m:oMath xmlns:m="http://schemas.openxmlformats.org/officeDocument/2006/math">
+                    <m:r>
+                      <a:rPr lang="en-US" sz="2000" i="1" dirty="0" smtClean="0">
+                        <a:latin typeface="Cambria Math" panose="02040503050406030204" pitchFamily="18" charset="0"/>
+                      </a:rPr>
+                      <m:t>𝑛</m:t>
+                    </m:r>
+                  </m:oMath>
+                </a14:m>
+                <a:r>
+                  <a:rPr lang="en-US" sz="2000" dirty="0"/>
+                  <a:t> and </a:t>
                 </a:r>
                 <a14:m>
                   <m:oMath xmlns:m="http://schemas.openxmlformats.org/officeDocument/2006/math">
@@ -13336,7 +13379,7 @@
                 </a14:m>
                 <a:r>
                   <a:rPr lang="en-US" sz="2000" dirty="0"/>
-                  <a:t> is large.</a:t>
+                  <a:t> are very large.</a:t>
                 </a:r>
               </a:p>
             </p:txBody>
@@ -13367,7 +13410,7 @@
               <a:blipFill>
                 <a:blip r:embed="rId4"/>
                 <a:stretch>
-                  <a:fillRect l="-1059" t="-700"/>
+                  <a:fillRect l="-706" t="-140"/>
                 </a:stretch>
               </a:blipFill>
             </p:spPr>
@@ -14181,8 +14224,8 @@
           </a:p>
         </p:txBody>
       </p:sp>
-      <mc:AlternateContent xmlns:mc="http://schemas.openxmlformats.org/markup-compatibility/2006">
-        <mc:Choice xmlns:a14="http://schemas.microsoft.com/office/drawing/2010/main" Requires="a14">
+      <mc:AlternateContent xmlns:mc="http://schemas.openxmlformats.org/markup-compatibility/2006" xmlns:a14="http://schemas.microsoft.com/office/drawing/2010/main">
+        <mc:Choice Requires="a14">
           <p:sp>
             <p:nvSpPr>
               <p:cNvPr id="6" name="Content Placeholder 5">
@@ -14311,7 +14354,7 @@
             </p:txBody>
           </p:sp>
         </mc:Choice>
-        <mc:Fallback>
+        <mc:Fallback xmlns="">
           <p:sp>
             <p:nvSpPr>
               <p:cNvPr id="6" name="Content Placeholder 5">

</xml_diff>